<commit_message>
fixed text, added link
</commit_message>
<xml_diff>
--- a/Resources/RustErrorHandling.pptx
+++ b/Resources/RustErrorHandling.pptx
@@ -6153,7 +6153,15 @@
           <a:p>
             <a:r>
               <a:rPr lang="en-US" dirty="0"/>
-              <a:t>You have to opt out of handling an error case.</a:t>
+              <a:t>You have to opt out if you don’t need </a:t>
+            </a:r>
+            <a:r>
+              <a:rPr lang="en-US"/>
+              <a:t>to handle </a:t>
+            </a:r>
+            <a:r>
+              <a:rPr lang="en-US" dirty="0"/>
+              <a:t>an error case.</a:t>
             </a:r>
             <a:br>
               <a:rPr lang="en-US" dirty="0"/>

</xml_diff>

<commit_message>
fixed a few typos
</commit_message>
<xml_diff>
--- a/Resources/RustErrorHandling.pptx
+++ b/Resources/RustErrorHandling.pptx
@@ -3872,7 +3872,7 @@
           <a:p>
             <a:r>
               <a:rPr lang="en-US" dirty="0"/>
-              <a:t>If you use code that doesn’t reliably avoid panics you may attempt to trap them:</a:t>
+              <a:t>If you need to use code that doesn’t reliably avoid panics you may attempt to trap them:</a:t>
             </a:r>
           </a:p>
           <a:p>
@@ -4635,7 +4635,7 @@
           <a:p>
             <a:r>
               <a:rPr lang="en-US" dirty="0"/>
-              <a:t>if let uses matching operator =</a:t>
+              <a:t>“if let” uses matching operator =</a:t>
             </a:r>
           </a:p>
           <a:p>
@@ -4822,7 +4822,7 @@
           <a:p>
             <a:r>
               <a:rPr lang="en-US" dirty="0"/>
-              <a:t>Demonstration code using match and let if</a:t>
+              <a:t>Demonstration code using match and if let</a:t>
             </a:r>
           </a:p>
         </p:txBody>
@@ -5056,7 +5056,7 @@
               <a:rPr lang="en-US" sz="2400" dirty="0" err="1">
                 <a:latin typeface="Consolas" panose="020B0609020204030204" pitchFamily="49" charset="0"/>
               </a:rPr>
-              <a:t>Fn</a:t>
+              <a:t>fn</a:t>
             </a:r>
             <a:r>
               <a:rPr lang="en-US" sz="2400" dirty="0">
@@ -5070,7 +5070,7 @@
               <a:rPr lang="en-US" sz="2400" dirty="0" err="1">
                 <a:latin typeface="Consolas" panose="020B0609020204030204" pitchFamily="49" charset="0"/>
               </a:rPr>
-              <a:t>Fn</a:t>
+              <a:t>fn</a:t>
             </a:r>
             <a:r>
               <a:rPr lang="en-US" sz="2400" dirty="0">
@@ -6966,7 +6966,7 @@
             <a:pPr lvl="1"/>
             <a:r>
               <a:rPr lang="en-US" dirty="0" err="1"/>
-              <a:t>Fn</a:t>
+              <a:t>fn</a:t>
             </a:r>
             <a:r>
               <a:rPr lang="en-US" dirty="0"/>
@@ -9182,7 +9182,7 @@
           <a:p>
             <a:r>
               <a:rPr lang="en-US" dirty="0"/>
-              <a:t>Using Result&lt;T,E&gt; with </a:t>
+              <a:t>Using Result&lt;T, E&gt; with </a:t>
             </a:r>
             <a:r>
               <a:rPr lang="en-US" dirty="0" err="1"/>

</xml_diff>

<commit_message>
small changes to text
</commit_message>
<xml_diff>
--- a/Resources/RustErrorHandling.pptx
+++ b/Resources/RustErrorHandling.pptx
@@ -226,7 +226,7 @@
           <a:p>
             <a:fld id="{055EF092-8A54-4677-B340-5EB5DEB17706}" type="datetimeFigureOut">
               <a:rPr lang="en-US" smtClean="0"/>
-              <a:t>5/3/2020</a:t>
+              <a:t>5/4/2020</a:t>
             </a:fld>
             <a:endParaRPr lang="en-US"/>
           </a:p>
@@ -640,7 +640,7 @@
           <a:p>
             <a:fld id="{36A0C7CB-2D82-423C-AB01-41EA338034A6}" type="datetime1">
               <a:rPr lang="en-US" smtClean="0"/>
-              <a:t>5/3/2020</a:t>
+              <a:t>5/4/2020</a:t>
             </a:fld>
             <a:endParaRPr lang="en-US"/>
           </a:p>
@@ -838,7 +838,7 @@
           <a:p>
             <a:fld id="{D7C78DD4-2E2E-452A-93AA-FBB2F74976C2}" type="datetime1">
               <a:rPr lang="en-US" smtClean="0"/>
-              <a:t>5/3/2020</a:t>
+              <a:t>5/4/2020</a:t>
             </a:fld>
             <a:endParaRPr lang="en-US"/>
           </a:p>
@@ -1046,7 +1046,7 @@
           <a:p>
             <a:fld id="{851591DF-6002-4AED-B0BC-482CBBAD8E96}" type="datetime1">
               <a:rPr lang="en-US" smtClean="0"/>
-              <a:t>5/3/2020</a:t>
+              <a:t>5/4/2020</a:t>
             </a:fld>
             <a:endParaRPr lang="en-US"/>
           </a:p>
@@ -1254,7 +1254,7 @@
           <a:p>
             <a:fld id="{2006D5C9-BA28-4C78-BA6C-970E82ACA9AF}" type="datetime1">
               <a:rPr lang="en-US" smtClean="0"/>
-              <a:t>5/3/2020</a:t>
+              <a:t>5/4/2020</a:t>
             </a:fld>
             <a:endParaRPr lang="en-US"/>
           </a:p>
@@ -1534,7 +1534,7 @@
           <a:p>
             <a:fld id="{ADEBBC10-72E9-4AB7-9CF2-6E5B73E4A905}" type="datetime1">
               <a:rPr lang="en-US" smtClean="0"/>
-              <a:t>5/3/2020</a:t>
+              <a:t>5/4/2020</a:t>
             </a:fld>
             <a:endParaRPr lang="en-US"/>
           </a:p>
@@ -1804,7 +1804,7 @@
           <a:p>
             <a:fld id="{4C68A4F5-DD82-4FF5-A92B-D8CBC256FF7C}" type="datetime1">
               <a:rPr lang="en-US" smtClean="0"/>
-              <a:t>5/3/2020</a:t>
+              <a:t>5/4/2020</a:t>
             </a:fld>
             <a:endParaRPr lang="en-US"/>
           </a:p>
@@ -2221,7 +2221,7 @@
           <a:p>
             <a:fld id="{1DBCDF70-3824-48C1-8216-8795ED01A5D0}" type="datetime1">
               <a:rPr lang="en-US" smtClean="0"/>
-              <a:t>5/3/2020</a:t>
+              <a:t>5/4/2020</a:t>
             </a:fld>
             <a:endParaRPr lang="en-US"/>
           </a:p>
@@ -2362,7 +2362,7 @@
           <a:p>
             <a:fld id="{E365BA3C-702A-4485-AC0E-B655E7C90C7F}" type="datetime1">
               <a:rPr lang="en-US" smtClean="0"/>
-              <a:t>5/3/2020</a:t>
+              <a:t>5/4/2020</a:t>
             </a:fld>
             <a:endParaRPr lang="en-US"/>
           </a:p>
@@ -2475,7 +2475,7 @@
           <a:p>
             <a:fld id="{2BFFD74F-4C20-47A0-AAFB-26C07C87E0C0}" type="datetime1">
               <a:rPr lang="en-US" smtClean="0"/>
-              <a:t>5/3/2020</a:t>
+              <a:t>5/4/2020</a:t>
             </a:fld>
             <a:endParaRPr lang="en-US"/>
           </a:p>
@@ -2786,7 +2786,7 @@
           <a:p>
             <a:fld id="{ECF2004F-AB7D-4F79-8768-579D51F2D46C}" type="datetime1">
               <a:rPr lang="en-US" smtClean="0"/>
-              <a:t>5/3/2020</a:t>
+              <a:t>5/4/2020</a:t>
             </a:fld>
             <a:endParaRPr lang="en-US"/>
           </a:p>
@@ -3074,7 +3074,7 @@
           <a:p>
             <a:fld id="{21C8C90A-9DD0-4D2B-BFD9-E76A52719A94}" type="datetime1">
               <a:rPr lang="en-US" smtClean="0"/>
-              <a:t>5/3/2020</a:t>
+              <a:t>5/4/2020</a:t>
             </a:fld>
             <a:endParaRPr lang="en-US"/>
           </a:p>
@@ -3315,7 +3315,7 @@
           <a:p>
             <a:fld id="{570724D7-3E32-49D3-AC4A-39ACC2C5F813}" type="datetime1">
               <a:rPr lang="en-US" smtClean="0"/>
-              <a:t>5/3/2020</a:t>
+              <a:t>5/4/2020</a:t>
             </a:fld>
             <a:endParaRPr lang="en-US"/>
           </a:p>
@@ -8791,7 +8791,7 @@
             </a:r>
             <a:r>
               <a:rPr lang="en-US" dirty="0"/>
-              <a:t> that define contracts for static and dynamic polymorphism, using generics and traits, essential for building flexible code that adapts to changing requirements.</a:t>
+              <a:t> that define contracts for static and dynamic polymorphism, using generics and trait inheritance, essential for building flexible code that adapts to changing requirements.</a:t>
             </a:r>
           </a:p>
           <a:p>
@@ -9156,18 +9156,28 @@
           <a:p>
             <a:r>
               <a:rPr lang="en-US" dirty="0"/>
-              <a:t>You will find more details about ownership, objects, generics, and the Rust build process in a series of podcasts that are being published by CSIAC.</a:t>
-            </a:r>
-          </a:p>
-          <a:p>
-            <a:r>
-              <a:rPr lang="en-US" dirty="0"/>
-              <a:t>More details about Rust are provided in a </a:t>
+              <a:t>You will find more details about ownership, objects, generics, and the Rust build process in a series of podcasts that are being published by CSIAC and also made available </a:t>
             </a:r>
             <a:r>
               <a:rPr lang="en-US" sz="2400" dirty="0">
                 <a:hlinkClick r:id="rId3"/>
               </a:rPr>
+              <a:t>here</a:t>
+            </a:r>
+            <a:r>
+              <a:rPr lang="en-US" sz="2400" dirty="0"/>
+              <a:t>.</a:t>
+            </a:r>
+          </a:p>
+          <a:p>
+            <a:r>
+              <a:rPr lang="en-US" dirty="0"/>
+              <a:t>More details about Rust are provided in a </a:t>
+            </a:r>
+            <a:r>
+              <a:rPr lang="en-US" sz="2400" dirty="0">
+                <a:hlinkClick r:id="rId4"/>
+              </a:rPr>
               <a:t>Rust Story</a:t>
             </a:r>
             <a:r>
@@ -9176,13 +9186,13 @@
             </a:r>
             <a:r>
               <a:rPr lang="en-US" sz="2400" dirty="0" err="1">
-                <a:hlinkClick r:id="rId4"/>
+                <a:hlinkClick r:id="rId5"/>
               </a:rPr>
               <a:t>github</a:t>
             </a:r>
             <a:r>
               <a:rPr lang="en-US" sz="2400" dirty="0">
-                <a:hlinkClick r:id="rId4"/>
+                <a:hlinkClick r:id="rId5"/>
               </a:rPr>
               <a:t> site</a:t>
             </a:r>

</xml_diff>

<commit_message>
small changes to text and code
</commit_message>
<xml_diff>
--- a/Resources/RustErrorHandling.pptx
+++ b/Resources/RustErrorHandling.pptx
@@ -3749,7 +3749,12 @@
             <p:ph type="ctrTitle"/>
           </p:nvPr>
         </p:nvSpPr>
-        <p:spPr/>
+        <p:spPr>
+          <a:xfrm>
+            <a:off x="1524000" y="1122363"/>
+            <a:ext cx="9144000" cy="2064182"/>
+          </a:xfrm>
+        </p:spPr>
         <p:txBody>
           <a:bodyPr/>
           <a:lstStyle/>
@@ -3758,6 +3763,14 @@
               <a:rPr lang="en-US" dirty="0"/>
               <a:t>Rust Error Handling</a:t>
             </a:r>
+            <a:br>
+              <a:rPr lang="en-US" dirty="0"/>
+            </a:br>
+            <a:r>
+              <a:rPr lang="en-US" sz="2800" dirty="0"/>
+              <a:t>Important Part of a Safe Systems Programming Language</a:t>
+            </a:r>
+            <a:endParaRPr lang="en-US" dirty="0"/>
           </a:p>
         </p:txBody>
       </p:sp>
@@ -4806,10 +4819,10 @@
       </p:sp>
       <p:pic>
         <p:nvPicPr>
-          <p:cNvPr id="6" name="Content Placeholder 5">
-            <a:extLst>
-              <a:ext uri="{FF2B5EF4-FFF2-40B4-BE49-F238E27FC236}">
-                <a16:creationId xmlns:a16="http://schemas.microsoft.com/office/drawing/2014/main" id="{FD08C1FB-5928-45B3-A4BF-91A9B48CBBAE}"/>
+          <p:cNvPr id="10" name="Content Placeholder 9">
+            <a:extLst>
+              <a:ext uri="{FF2B5EF4-FFF2-40B4-BE49-F238E27FC236}">
+                <a16:creationId xmlns:a16="http://schemas.microsoft.com/office/drawing/2014/main" id="{5500E1FC-7799-4C58-A412-4E2E7646FD48}"/>
               </a:ext>
             </a:extLst>
           </p:cNvPr>
@@ -4817,7 +4830,7 @@
             <a:picLocks noGrp="1" noChangeAspect="1"/>
           </p:cNvPicPr>
           <p:nvPr>
-            <p:ph sz="half" idx="1"/>
+            <p:ph sz="half" idx="2"/>
           </p:nvPr>
         </p:nvPicPr>
         <p:blipFill>
@@ -4828,8 +4841,8 @@
         </p:blipFill>
         <p:spPr>
           <a:xfrm>
-            <a:off x="288885" y="157678"/>
-            <a:ext cx="6354656" cy="6248569"/>
+            <a:off x="6720042" y="157677"/>
+            <a:ext cx="5131383" cy="6248569"/>
           </a:xfrm>
           <a:prstGeom prst="rect">
             <a:avLst/>
@@ -4838,10 +4851,10 @@
       </p:pic>
       <p:pic>
         <p:nvPicPr>
-          <p:cNvPr id="10" name="Content Placeholder 9">
-            <a:extLst>
-              <a:ext uri="{FF2B5EF4-FFF2-40B4-BE49-F238E27FC236}">
-                <a16:creationId xmlns:a16="http://schemas.microsoft.com/office/drawing/2014/main" id="{5500E1FC-7799-4C58-A412-4E2E7646FD48}"/>
+          <p:cNvPr id="11" name="Content Placeholder 10">
+            <a:extLst>
+              <a:ext uri="{FF2B5EF4-FFF2-40B4-BE49-F238E27FC236}">
+                <a16:creationId xmlns:a16="http://schemas.microsoft.com/office/drawing/2014/main" id="{F372F357-68E3-4A6F-B009-6CDFFEA6D0A8}"/>
               </a:ext>
             </a:extLst>
           </p:cNvPr>
@@ -4849,7 +4862,7 @@
             <a:picLocks noGrp="1" noChangeAspect="1"/>
           </p:cNvPicPr>
           <p:nvPr>
-            <p:ph sz="half" idx="2"/>
+            <p:ph sz="half" idx="1"/>
           </p:nvPr>
         </p:nvPicPr>
         <p:blipFill>
@@ -4860,8 +4873,8 @@
         </p:blipFill>
         <p:spPr>
           <a:xfrm>
-            <a:off x="6766223" y="157677"/>
-            <a:ext cx="5131383" cy="6248569"/>
+            <a:off x="402188" y="157676"/>
+            <a:ext cx="6046803" cy="6248569"/>
           </a:xfrm>
           <a:prstGeom prst="rect">
             <a:avLst/>
@@ -4886,7 +4899,7 @@
         </p:nvSpPr>
         <p:spPr>
           <a:xfrm>
-            <a:off x="3669410" y="1077084"/>
+            <a:off x="3669410" y="1178681"/>
             <a:ext cx="3677958" cy="621638"/>
           </a:xfrm>
           <a:solidFill>
@@ -7874,7 +7887,7 @@
         </p:blipFill>
         <p:spPr>
           <a:xfrm>
-            <a:off x="838200" y="1309063"/>
+            <a:off x="561112" y="1309063"/>
             <a:ext cx="5181600" cy="2722647"/>
           </a:xfrm>
           <a:prstGeom prst="rect">
@@ -7884,10 +7897,10 @@
       </p:pic>
       <p:pic>
         <p:nvPicPr>
-          <p:cNvPr id="19" name="Content Placeholder 18">
-            <a:extLst>
-              <a:ext uri="{FF2B5EF4-FFF2-40B4-BE49-F238E27FC236}">
-                <a16:creationId xmlns:a16="http://schemas.microsoft.com/office/drawing/2014/main" id="{764F3265-0AA8-48E2-830C-38DC4A06B881}"/>
+          <p:cNvPr id="6" name="Content Placeholder 5">
+            <a:extLst>
+              <a:ext uri="{FF2B5EF4-FFF2-40B4-BE49-F238E27FC236}">
+                <a16:creationId xmlns:a16="http://schemas.microsoft.com/office/drawing/2014/main" id="{D872EA37-0777-4E83-A774-7D622AFF4E70}"/>
               </a:ext>
             </a:extLst>
           </p:cNvPr>
@@ -7906,8 +7919,8 @@
         </p:blipFill>
         <p:spPr>
           <a:xfrm>
-            <a:off x="6172202" y="1324808"/>
-            <a:ext cx="5181600" cy="3575752"/>
+            <a:off x="5895112" y="1309063"/>
+            <a:ext cx="5824332" cy="3891010"/>
           </a:xfrm>
           <a:prstGeom prst="rect">
             <a:avLst/>
@@ -8750,7 +8763,7 @@
           <a:p>
             <a:r>
               <a:rPr lang="en-US" dirty="0"/>
-              <a:t>Rust incorporates a number of interesting ideas that support system programming:</a:t>
+              <a:t>Rust incorporates a number of interesting ideas that support modern system programming:</a:t>
             </a:r>
           </a:p>
           <a:p>
@@ -9065,7 +9078,11 @@
             <p:ph type="title"/>
           </p:nvPr>
         </p:nvSpPr>
-        <p:spPr/>
+        <p:spPr>
+          <a:solidFill>
+            <a:schemeClr val="bg2"/>
+          </a:solidFill>
+        </p:spPr>
         <p:txBody>
           <a:bodyPr/>
           <a:lstStyle/>
@@ -9280,7 +9297,12 @@
             <p:ph type="title"/>
           </p:nvPr>
         </p:nvSpPr>
-        <p:spPr/>
+        <p:spPr>
+          <a:xfrm>
+            <a:off x="838200" y="365126"/>
+            <a:ext cx="10515600" cy="599619"/>
+          </a:xfrm>
+        </p:spPr>
         <p:txBody>
           <a:bodyPr/>
           <a:lstStyle/>
@@ -9308,10 +9330,21 @@
             <p:ph idx="1"/>
           </p:nvPr>
         </p:nvSpPr>
-        <p:spPr/>
-        <p:txBody>
-          <a:bodyPr/>
-          <a:lstStyle/>
+        <p:spPr>
+          <a:xfrm>
+            <a:off x="838200" y="1099128"/>
+            <a:ext cx="10515600" cy="5077836"/>
+          </a:xfrm>
+        </p:spPr>
+        <p:txBody>
+          <a:bodyPr/>
+          <a:lstStyle/>
+          <a:p>
+            <a:r>
+              <a:rPr lang="en-US" dirty="0"/>
+              <a:t>Rust identifies functions that may fail by returning Result&lt;T, E&gt;</a:t>
+            </a:r>
+          </a:p>
           <a:p>
             <a:r>
               <a:rPr lang="en-US" dirty="0"/>
@@ -9332,15 +9365,7 @@
           <a:p>
             <a:r>
               <a:rPr lang="en-US" dirty="0"/>
-              <a:t>You have to opt out if you don’t need </a:t>
-            </a:r>
-            <a:r>
-              <a:rPr lang="en-US"/>
-              <a:t>to handle </a:t>
-            </a:r>
-            <a:r>
-              <a:rPr lang="en-US" dirty="0"/>
-              <a:t>an error case.</a:t>
+              <a:t>You have to opt out if you don’t need to handle an error case.</a:t>
             </a:r>
             <a:br>
               <a:rPr lang="en-US" dirty="0"/>
@@ -9413,7 +9438,7 @@
         </p:blipFill>
         <p:spPr>
           <a:xfrm>
-            <a:off x="1172668" y="2198894"/>
+            <a:off x="1172668" y="2503691"/>
             <a:ext cx="4690663" cy="822133"/>
           </a:xfrm>
           <a:prstGeom prst="rect">
@@ -9443,7 +9468,7 @@
         </p:blipFill>
         <p:spPr>
           <a:xfrm>
-            <a:off x="6169879" y="1804198"/>
+            <a:off x="6169879" y="2108995"/>
             <a:ext cx="5091731" cy="1568964"/>
           </a:xfrm>
           <a:prstGeom prst="rect">
@@ -9473,7 +9498,7 @@
         </p:blipFill>
         <p:spPr>
           <a:xfrm>
-            <a:off x="1242358" y="3860480"/>
+            <a:off x="1242358" y="4165277"/>
             <a:ext cx="4597654" cy="872064"/>
           </a:xfrm>
           <a:prstGeom prst="rect">

</xml_diff>

<commit_message>
created Distinguished Rust post
</commit_message>
<xml_diff>
--- a/Resources/RustErrorHandling.pptx
+++ b/Resources/RustErrorHandling.pptx
@@ -226,7 +226,7 @@
           <a:p>
             <a:fld id="{055EF092-8A54-4677-B340-5EB5DEB17706}" type="datetimeFigureOut">
               <a:rPr lang="en-US" smtClean="0"/>
-              <a:t>5/6/2020</a:t>
+              <a:t>10/9/2024</a:t>
             </a:fld>
             <a:endParaRPr lang="en-US"/>
           </a:p>
@@ -640,7 +640,7 @@
           <a:p>
             <a:fld id="{36A0C7CB-2D82-423C-AB01-41EA338034A6}" type="datetime1">
               <a:rPr lang="en-US" smtClean="0"/>
-              <a:t>5/6/2020</a:t>
+              <a:t>10/9/2024</a:t>
             </a:fld>
             <a:endParaRPr lang="en-US"/>
           </a:p>
@@ -838,7 +838,7 @@
           <a:p>
             <a:fld id="{D7C78DD4-2E2E-452A-93AA-FBB2F74976C2}" type="datetime1">
               <a:rPr lang="en-US" smtClean="0"/>
-              <a:t>5/6/2020</a:t>
+              <a:t>10/9/2024</a:t>
             </a:fld>
             <a:endParaRPr lang="en-US"/>
           </a:p>
@@ -1046,7 +1046,7 @@
           <a:p>
             <a:fld id="{851591DF-6002-4AED-B0BC-482CBBAD8E96}" type="datetime1">
               <a:rPr lang="en-US" smtClean="0"/>
-              <a:t>5/6/2020</a:t>
+              <a:t>10/9/2024</a:t>
             </a:fld>
             <a:endParaRPr lang="en-US"/>
           </a:p>
@@ -1254,7 +1254,7 @@
           <a:p>
             <a:fld id="{2006D5C9-BA28-4C78-BA6C-970E82ACA9AF}" type="datetime1">
               <a:rPr lang="en-US" smtClean="0"/>
-              <a:t>5/6/2020</a:t>
+              <a:t>10/9/2024</a:t>
             </a:fld>
             <a:endParaRPr lang="en-US"/>
           </a:p>
@@ -1534,7 +1534,7 @@
           <a:p>
             <a:fld id="{ADEBBC10-72E9-4AB7-9CF2-6E5B73E4A905}" type="datetime1">
               <a:rPr lang="en-US" smtClean="0"/>
-              <a:t>5/6/2020</a:t>
+              <a:t>10/9/2024</a:t>
             </a:fld>
             <a:endParaRPr lang="en-US"/>
           </a:p>
@@ -1804,7 +1804,7 @@
           <a:p>
             <a:fld id="{4C68A4F5-DD82-4FF5-A92B-D8CBC256FF7C}" type="datetime1">
               <a:rPr lang="en-US" smtClean="0"/>
-              <a:t>5/6/2020</a:t>
+              <a:t>10/9/2024</a:t>
             </a:fld>
             <a:endParaRPr lang="en-US"/>
           </a:p>
@@ -2221,7 +2221,7 @@
           <a:p>
             <a:fld id="{1DBCDF70-3824-48C1-8216-8795ED01A5D0}" type="datetime1">
               <a:rPr lang="en-US" smtClean="0"/>
-              <a:t>5/6/2020</a:t>
+              <a:t>10/9/2024</a:t>
             </a:fld>
             <a:endParaRPr lang="en-US"/>
           </a:p>
@@ -2362,7 +2362,7 @@
           <a:p>
             <a:fld id="{E365BA3C-702A-4485-AC0E-B655E7C90C7F}" type="datetime1">
               <a:rPr lang="en-US" smtClean="0"/>
-              <a:t>5/6/2020</a:t>
+              <a:t>10/9/2024</a:t>
             </a:fld>
             <a:endParaRPr lang="en-US"/>
           </a:p>
@@ -2475,7 +2475,7 @@
           <a:p>
             <a:fld id="{2BFFD74F-4C20-47A0-AAFB-26C07C87E0C0}" type="datetime1">
               <a:rPr lang="en-US" smtClean="0"/>
-              <a:t>5/6/2020</a:t>
+              <a:t>10/9/2024</a:t>
             </a:fld>
             <a:endParaRPr lang="en-US"/>
           </a:p>
@@ -2786,7 +2786,7 @@
           <a:p>
             <a:fld id="{ECF2004F-AB7D-4F79-8768-579D51F2D46C}" type="datetime1">
               <a:rPr lang="en-US" smtClean="0"/>
-              <a:t>5/6/2020</a:t>
+              <a:t>10/9/2024</a:t>
             </a:fld>
             <a:endParaRPr lang="en-US"/>
           </a:p>
@@ -3074,7 +3074,7 @@
           <a:p>
             <a:fld id="{21C8C90A-9DD0-4D2B-BFD9-E76A52719A94}" type="datetime1">
               <a:rPr lang="en-US" smtClean="0"/>
-              <a:t>5/6/2020</a:t>
+              <a:t>10/9/2024</a:t>
             </a:fld>
             <a:endParaRPr lang="en-US"/>
           </a:p>
@@ -3315,7 +3315,7 @@
           <a:p>
             <a:fld id="{570724D7-3E32-49D3-AC4A-39ACC2C5F813}" type="datetime1">
               <a:rPr lang="en-US" smtClean="0"/>
-              <a:t>5/6/2020</a:t>
+              <a:t>10/9/2024</a:t>
             </a:fld>
             <a:endParaRPr lang="en-US"/>
           </a:p>
@@ -9758,14 +9758,14 @@
           <a:p>
             <a:r>
               <a:rPr lang="en-US" dirty="0"/>
-              <a:t>A panic is a program exit that attempts to unwind the stack, dropping each object residing in the stack.</a:t>
+              <a:t>A panic is a thread exit that attempts to unwind the stack, dropping each object residing in the stack.</a:t>
             </a:r>
           </a:p>
           <a:p>
             <a:pPr lvl="1"/>
             <a:r>
               <a:rPr lang="en-US" dirty="0"/>
-              <a:t>Panics can be trapped and handled to avoid program exit</a:t>
+              <a:t>Panics can be trapped and handled to avoid thread exit</a:t>
             </a:r>
           </a:p>
           <a:p>

</xml_diff>